<commit_message>
Aplicações de conteúdos de base da UC- SCS
atividade do dia 06/03 do professor Calvetti.
</commit_message>
<xml_diff>
--- a/Aplicações de conteúdos de base da UC- SCS grupo.pptx
+++ b/Aplicações de conteúdos de base da UC- SCS grupo.pptx
@@ -111,6 +111,11 @@
       </a:defRPr>
     </a:lvl9pPr>
   </p:defaultTextStyle>
+  <p:extLst>
+    <p:ext uri="{EFAFB233-063F-42B5-8137-9DF3F51BA10A}">
+      <p15:sldGuideLst xmlns:p15="http://schemas.microsoft.com/office/powerpoint/2012/main"/>
+    </p:ext>
+  </p:extLst>
 </p:presentation>
 </file>
 
@@ -342,7 +347,7 @@
           <a:p>
             <a:fld id="{3219D599-BA90-48EE-AE9C-63BEF55E5A7D}" type="datetimeFigureOut">
               <a:rPr lang="pt-BR" smtClean="0"/>
-              <a:t>05/03/2025</a:t>
+              <a:t>06/03/2025</a:t>
             </a:fld>
             <a:endParaRPr lang="pt-BR"/>
           </a:p>
@@ -550,7 +555,7 @@
           <a:p>
             <a:fld id="{3219D599-BA90-48EE-AE9C-63BEF55E5A7D}" type="datetimeFigureOut">
               <a:rPr lang="pt-BR" smtClean="0"/>
-              <a:t>05/03/2025</a:t>
+              <a:t>06/03/2025</a:t>
             </a:fld>
             <a:endParaRPr lang="pt-BR"/>
           </a:p>
@@ -808,7 +813,7 @@
           <a:p>
             <a:fld id="{3219D599-BA90-48EE-AE9C-63BEF55E5A7D}" type="datetimeFigureOut">
               <a:rPr lang="pt-BR" smtClean="0"/>
-              <a:t>05/03/2025</a:t>
+              <a:t>06/03/2025</a:t>
             </a:fld>
             <a:endParaRPr lang="pt-BR"/>
           </a:p>
@@ -978,7 +983,7 @@
           <a:p>
             <a:fld id="{3219D599-BA90-48EE-AE9C-63BEF55E5A7D}" type="datetimeFigureOut">
               <a:rPr lang="pt-BR" smtClean="0"/>
-              <a:t>05/03/2025</a:t>
+              <a:t>06/03/2025</a:t>
             </a:fld>
             <a:endParaRPr lang="pt-BR"/>
           </a:p>
@@ -1315,7 +1320,7 @@
           <a:p>
             <a:fld id="{3219D599-BA90-48EE-AE9C-63BEF55E5A7D}" type="datetimeFigureOut">
               <a:rPr lang="pt-BR" smtClean="0"/>
-              <a:t>05/03/2025</a:t>
+              <a:t>06/03/2025</a:t>
             </a:fld>
             <a:endParaRPr lang="pt-BR"/>
           </a:p>
@@ -1590,7 +1595,7 @@
           <a:p>
             <a:fld id="{3219D599-BA90-48EE-AE9C-63BEF55E5A7D}" type="datetimeFigureOut">
               <a:rPr lang="pt-BR" smtClean="0"/>
-              <a:t>05/03/2025</a:t>
+              <a:t>06/03/2025</a:t>
             </a:fld>
             <a:endParaRPr lang="pt-BR"/>
           </a:p>
@@ -1969,7 +1974,7 @@
           <a:p>
             <a:fld id="{3219D599-BA90-48EE-AE9C-63BEF55E5A7D}" type="datetimeFigureOut">
               <a:rPr lang="pt-BR" smtClean="0"/>
-              <a:t>05/03/2025</a:t>
+              <a:t>06/03/2025</a:t>
             </a:fld>
             <a:endParaRPr lang="pt-BR"/>
           </a:p>
@@ -2087,7 +2092,7 @@
           <a:p>
             <a:fld id="{3219D599-BA90-48EE-AE9C-63BEF55E5A7D}" type="datetimeFigureOut">
               <a:rPr lang="pt-BR" smtClean="0"/>
-              <a:t>05/03/2025</a:t>
+              <a:t>06/03/2025</a:t>
             </a:fld>
             <a:endParaRPr lang="pt-BR"/>
           </a:p>
@@ -2260,7 +2265,7 @@
           <a:p>
             <a:fld id="{3219D599-BA90-48EE-AE9C-63BEF55E5A7D}" type="datetimeFigureOut">
               <a:rPr lang="pt-BR" smtClean="0"/>
-              <a:t>05/03/2025</a:t>
+              <a:t>06/03/2025</a:t>
             </a:fld>
             <a:endParaRPr lang="pt-BR"/>
           </a:p>
@@ -2616,7 +2621,7 @@
           <a:p>
             <a:fld id="{3219D599-BA90-48EE-AE9C-63BEF55E5A7D}" type="datetimeFigureOut">
               <a:rPr lang="pt-BR" smtClean="0"/>
-              <a:t>05/03/2025</a:t>
+              <a:t>06/03/2025</a:t>
             </a:fld>
             <a:endParaRPr lang="pt-BR"/>
           </a:p>
@@ -2995,7 +3000,7 @@
           <a:p>
             <a:fld id="{3219D599-BA90-48EE-AE9C-63BEF55E5A7D}" type="datetimeFigureOut">
               <a:rPr lang="pt-BR" smtClean="0"/>
-              <a:t>05/03/2025</a:t>
+              <a:t>06/03/2025</a:t>
             </a:fld>
             <a:endParaRPr lang="pt-BR"/>
           </a:p>
@@ -3284,7 +3289,7 @@
           <a:p>
             <a:fld id="{3219D599-BA90-48EE-AE9C-63BEF55E5A7D}" type="datetimeFigureOut">
               <a:rPr lang="pt-BR" smtClean="0"/>
-              <a:t>05/03/2025</a:t>
+              <a:t>06/03/2025</a:t>
             </a:fld>
             <a:endParaRPr lang="pt-BR"/>
           </a:p>
@@ -3826,7 +3831,7 @@
         </p:nvSpPr>
         <p:spPr>
           <a:xfrm>
-            <a:off x="1019664" y="1492898"/>
+            <a:off x="1019664" y="387093"/>
             <a:ext cx="10152667" cy="3629607"/>
           </a:xfrm>
         </p:spPr>
@@ -3899,8 +3904,8 @@
         </p:nvSpPr>
         <p:spPr>
           <a:xfrm>
-            <a:off x="1157475" y="4656103"/>
-            <a:ext cx="9877047" cy="1399846"/>
+            <a:off x="647114" y="3221270"/>
+            <a:ext cx="10525217" cy="3249637"/>
           </a:xfrm>
         </p:spPr>
         <p:txBody>
@@ -3914,81 +3919,129 @@
                 <a:latin typeface="Courier New" panose="02070309020205020404" pitchFamily="49" charset="0"/>
                 <a:cs typeface="Courier New" panose="02070309020205020404" pitchFamily="49" charset="0"/>
               </a:rPr>
-              <a:t>Professor Calvetti</a:t>
-            </a:r>
-          </a:p>
-          <a:p>
+              <a:t>Professor </a:t>
+            </a:r>
+            <a:r>
+              <a:rPr lang="pt-BR" sz="1800" b="1" dirty="0" err="1">
+                <a:latin typeface="Courier New" panose="02070309020205020404" pitchFamily="49" charset="0"/>
+                <a:cs typeface="Courier New" panose="02070309020205020404" pitchFamily="49" charset="0"/>
+              </a:rPr>
+              <a:t>Calvetti</a:t>
+            </a:r>
+            <a:r>
+              <a:rPr lang="pt-BR" sz="1800" b="1" dirty="0">
+                <a:latin typeface="Courier New" panose="02070309020205020404" pitchFamily="49" charset="0"/>
+                <a:cs typeface="Courier New" panose="02070309020205020404" pitchFamily="49" charset="0"/>
+              </a:rPr>
+              <a:t> – universidade são judas Tadeu – </a:t>
+            </a:r>
+            <a:r>
+              <a:rPr lang="pt-BR" sz="1800" b="1" dirty="0" err="1">
+                <a:latin typeface="Courier New" panose="02070309020205020404" pitchFamily="49" charset="0"/>
+                <a:cs typeface="Courier New" panose="02070309020205020404" pitchFamily="49" charset="0"/>
+              </a:rPr>
+              <a:t>mooca</a:t>
+            </a:r>
+            <a:endParaRPr lang="pt-BR" sz="1800" b="1" dirty="0">
+              <a:latin typeface="Courier New" panose="02070309020205020404" pitchFamily="49" charset="0"/>
+              <a:cs typeface="Courier New" panose="02070309020205020404" pitchFamily="49" charset="0"/>
+            </a:endParaRPr>
+          </a:p>
+          <a:p>
+            <a:r>
+              <a:rPr lang="pt-BR" sz="1800" b="1" dirty="0">
+                <a:latin typeface="Courier New" panose="02070309020205020404" pitchFamily="49" charset="0"/>
+                <a:cs typeface="Courier New" panose="02070309020205020404" pitchFamily="49" charset="0"/>
+              </a:rPr>
+              <a:t>Larissa </a:t>
+            </a:r>
             <a:r>
               <a:rPr lang="pt-BR" sz="1400" b="1" dirty="0">
                 <a:latin typeface="Courier New" panose="02070309020205020404" pitchFamily="49" charset="0"/>
                 <a:cs typeface="Courier New" panose="02070309020205020404" pitchFamily="49" charset="0"/>
               </a:rPr>
-              <a:t>Larissa oliveira, </a:t>
-            </a:r>
-            <a:r>
-              <a:rPr lang="pt-BR" sz="1400" b="1" dirty="0" err="1">
+              <a:t>Oliveira</a:t>
+            </a:r>
+            <a:r>
+              <a:rPr lang="pt-BR" sz="1800" b="1" dirty="0">
                 <a:latin typeface="Courier New" panose="02070309020205020404" pitchFamily="49" charset="0"/>
                 <a:cs typeface="Courier New" panose="02070309020205020404" pitchFamily="49" charset="0"/>
               </a:rPr>
-              <a:t>rafaela</a:t>
-            </a:r>
-            <a:r>
-              <a:rPr lang="pt-BR" sz="1400" b="1" dirty="0">
+              <a:t> dos Santos – RA:82516871</a:t>
+            </a:r>
+          </a:p>
+          <a:p>
+            <a:r>
+              <a:rPr lang="pt-BR" sz="1800" b="1" dirty="0">
                 <a:latin typeface="Courier New" panose="02070309020205020404" pitchFamily="49" charset="0"/>
                 <a:cs typeface="Courier New" panose="02070309020205020404" pitchFamily="49" charset="0"/>
               </a:rPr>
-              <a:t> maria da silva, Henrique lima, Rafael gomes,  </a:t>
-            </a:r>
-          </a:p>
-          <a:p>
-            <a:r>
-              <a:rPr lang="pt-BR" sz="1400" b="1" dirty="0" err="1">
+              <a:t>Emilly dos santos </a:t>
+            </a:r>
+            <a:r>
+              <a:rPr lang="pt-BR" sz="1800" b="1" dirty="0" err="1">
                 <a:latin typeface="Courier New" panose="02070309020205020404" pitchFamily="49" charset="0"/>
                 <a:cs typeface="Courier New" panose="02070309020205020404" pitchFamily="49" charset="0"/>
               </a:rPr>
-              <a:t>douglas</a:t>
-            </a:r>
-            <a:r>
-              <a:rPr lang="pt-BR" sz="1400" b="1" dirty="0">
+              <a:t>ferreira</a:t>
+            </a:r>
+            <a:r>
+              <a:rPr lang="pt-BR" sz="1800" b="1" dirty="0">
                 <a:latin typeface="Courier New" panose="02070309020205020404" pitchFamily="49" charset="0"/>
                 <a:cs typeface="Courier New" panose="02070309020205020404" pitchFamily="49" charset="0"/>
               </a:rPr>
-              <a:t> </a:t>
-            </a:r>
-            <a:r>
-              <a:rPr lang="pt-BR" sz="1400" b="1" dirty="0" err="1">
+              <a:t> – RA:825153657</a:t>
+            </a:r>
+          </a:p>
+          <a:p>
+            <a:r>
+              <a:rPr lang="pt-BR" sz="1800" b="1" dirty="0">
                 <a:latin typeface="Courier New" panose="02070309020205020404" pitchFamily="49" charset="0"/>
                 <a:cs typeface="Courier New" panose="02070309020205020404" pitchFamily="49" charset="0"/>
               </a:rPr>
-              <a:t>envangelista</a:t>
-            </a:r>
-            <a:r>
-              <a:rPr lang="pt-BR" sz="1400" b="1" dirty="0">
+              <a:t>Rafaela Maria da Silva – RA:825134501</a:t>
+            </a:r>
+          </a:p>
+          <a:p>
+            <a:r>
+              <a:rPr lang="pt-BR" sz="1800" b="1" dirty="0">
                 <a:latin typeface="Courier New" panose="02070309020205020404" pitchFamily="49" charset="0"/>
                 <a:cs typeface="Courier New" panose="02070309020205020404" pitchFamily="49" charset="0"/>
               </a:rPr>
-              <a:t> e </a:t>
-            </a:r>
-            <a:r>
-              <a:rPr lang="pt-BR" sz="1400" b="1" dirty="0" err="1">
+              <a:t>Douglas Evangelista – RA:82516629</a:t>
+            </a:r>
+          </a:p>
+          <a:p>
+            <a:r>
+              <a:rPr lang="pt-BR" sz="1800" b="1" dirty="0">
                 <a:latin typeface="Courier New" panose="02070309020205020404" pitchFamily="49" charset="0"/>
                 <a:cs typeface="Courier New" panose="02070309020205020404" pitchFamily="49" charset="0"/>
               </a:rPr>
-              <a:t>emily</a:t>
-            </a:r>
-            <a:r>
-              <a:rPr lang="pt-BR" sz="1400" b="1" dirty="0">
+              <a:t>Rafael Gomes </a:t>
+            </a:r>
+            <a:r>
+              <a:rPr lang="pt-BR" sz="1800" b="1" dirty="0" err="1">
                 <a:latin typeface="Courier New" panose="02070309020205020404" pitchFamily="49" charset="0"/>
                 <a:cs typeface="Courier New" panose="02070309020205020404" pitchFamily="49" charset="0"/>
               </a:rPr>
-              <a:t> dos santos.</a:t>
-            </a:r>
-          </a:p>
-          <a:p>
-            <a:endParaRPr lang="pt-BR" sz="1400" b="1" dirty="0">
-              <a:latin typeface="Courier New" panose="02070309020205020404" pitchFamily="49" charset="0"/>
-              <a:cs typeface="Courier New" panose="02070309020205020404" pitchFamily="49" charset="0"/>
-            </a:endParaRPr>
+              <a:t>Taiar</a:t>
+            </a:r>
+            <a:r>
+              <a:rPr lang="pt-BR" sz="1800" b="1" dirty="0">
+                <a:latin typeface="Courier New" panose="02070309020205020404" pitchFamily="49" charset="0"/>
+                <a:cs typeface="Courier New" panose="02070309020205020404" pitchFamily="49" charset="0"/>
+              </a:rPr>
+              <a:t> – RA:825113488</a:t>
+            </a:r>
+          </a:p>
+          <a:p>
+            <a:r>
+              <a:rPr lang="pt-BR" sz="1800" b="1" dirty="0">
+                <a:latin typeface="Courier New" panose="02070309020205020404" pitchFamily="49" charset="0"/>
+                <a:cs typeface="Courier New" panose="02070309020205020404" pitchFamily="49" charset="0"/>
+              </a:rPr>
+              <a:t>Henrique Lima Cândido – RA:825156385</a:t>
+            </a:r>
           </a:p>
           <a:p>
             <a:endParaRPr lang="pt-BR" sz="1800" b="1" dirty="0">

</xml_diff>